<commit_message>
add lects 6, 7, and 8
</commit_message>
<xml_diff>
--- a/lectures/06-unofficial.pptx
+++ b/lectures/06-unofficial.pptx
@@ -5,7 +5,7 @@
     <p:sldMasterId id="2147483648" r:id="rId1"/>
   </p:sldMasterIdLst>
   <p:notesMasterIdLst>
-    <p:notesMasterId r:id="rId41"/>
+    <p:notesMasterId r:id="rId39"/>
   </p:notesMasterIdLst>
   <p:sldIdLst>
     <p:sldId id="256" r:id="rId2"/>
@@ -45,8 +45,6 @@
     <p:sldId id="287" r:id="rId36"/>
     <p:sldId id="288" r:id="rId37"/>
     <p:sldId id="289" r:id="rId38"/>
-    <p:sldId id="290" r:id="rId39"/>
-    <p:sldId id="291" r:id="rId40"/>
   </p:sldIdLst>
   <p:sldSz cx="9144000" cy="5143500" type="screen16x9"/>
   <p:notesSz cx="6858000" cy="9144000"/>
@@ -246,7 +244,7 @@
           <a:p>
             <a:fld id="{F360CC50-93B8-D643-A795-52111D109771}" type="datetimeFigureOut">
               <a:rPr lang="en-US" smtClean="0"/>
-              <a:t>2/13/23</a:t>
+              <a:t>2/19/23</a:t>
             </a:fld>
             <a:endParaRPr lang="en-US"/>
           </a:p>
@@ -1548,7 +1546,7 @@
           <a:p>
             <a:fld id="{241EB5C9-1307-BA42-ABA2-0BC069CD8E7F}" type="datetimeFigureOut">
               <a:rPr lang="en-US" smtClean="0"/>
-              <a:t>2/13/23</a:t>
+              <a:t>2/19/23</a:t>
             </a:fld>
             <a:endParaRPr lang="en-US"/>
           </a:p>
@@ -1726,7 +1724,7 @@
           <a:p>
             <a:fld id="{241EB5C9-1307-BA42-ABA2-0BC069CD8E7F}" type="datetimeFigureOut">
               <a:rPr lang="en-US" smtClean="0"/>
-              <a:t>2/13/23</a:t>
+              <a:t>2/19/23</a:t>
             </a:fld>
             <a:endParaRPr lang="en-US"/>
           </a:p>
@@ -1904,7 +1902,7 @@
           <a:p>
             <a:fld id="{241EB5C9-1307-BA42-ABA2-0BC069CD8E7F}" type="datetimeFigureOut">
               <a:rPr lang="en-US" smtClean="0"/>
-              <a:t>2/13/23</a:t>
+              <a:t>2/19/23</a:t>
             </a:fld>
             <a:endParaRPr lang="en-US"/>
           </a:p>
@@ -2163,7 +2161,7 @@
           <a:p>
             <a:fld id="{241EB5C9-1307-BA42-ABA2-0BC069CD8E7F}" type="datetimeFigureOut">
               <a:rPr lang="en-US" smtClean="0"/>
-              <a:t>2/13/23</a:t>
+              <a:t>2/19/23</a:t>
             </a:fld>
             <a:endParaRPr lang="en-US"/>
           </a:p>
@@ -2458,7 +2456,7 @@
           <a:p>
             <a:fld id="{241EB5C9-1307-BA42-ABA2-0BC069CD8E7F}" type="datetimeFigureOut">
               <a:rPr lang="en-US" smtClean="0"/>
-              <a:t>2/13/23</a:t>
+              <a:t>2/19/23</a:t>
             </a:fld>
             <a:endParaRPr lang="en-US"/>
           </a:p>
@@ -2883,7 +2881,7 @@
           <a:p>
             <a:fld id="{241EB5C9-1307-BA42-ABA2-0BC069CD8E7F}" type="datetimeFigureOut">
               <a:rPr lang="en-US" smtClean="0"/>
-              <a:t>2/13/23</a:t>
+              <a:t>2/19/23</a:t>
             </a:fld>
             <a:endParaRPr lang="en-US"/>
           </a:p>
@@ -3010,7 +3008,7 @@
           <a:p>
             <a:fld id="{241EB5C9-1307-BA42-ABA2-0BC069CD8E7F}" type="datetimeFigureOut">
               <a:rPr lang="en-US" smtClean="0"/>
-              <a:t>2/13/23</a:t>
+              <a:t>2/19/23</a:t>
             </a:fld>
             <a:endParaRPr lang="en-US"/>
           </a:p>
@@ -3105,7 +3103,7 @@
           <a:p>
             <a:fld id="{241EB5C9-1307-BA42-ABA2-0BC069CD8E7F}" type="datetimeFigureOut">
               <a:rPr lang="en-US" smtClean="0"/>
-              <a:t>2/13/23</a:t>
+              <a:t>2/19/23</a:t>
             </a:fld>
             <a:endParaRPr lang="en-US"/>
           </a:p>
@@ -3386,7 +3384,7 @@
           <a:p>
             <a:fld id="{241EB5C9-1307-BA42-ABA2-0BC069CD8E7F}" type="datetimeFigureOut">
               <a:rPr lang="en-US" smtClean="0"/>
-              <a:t>2/13/23</a:t>
+              <a:t>2/19/23</a:t>
             </a:fld>
             <a:endParaRPr lang="en-US"/>
           </a:p>
@@ -3638,7 +3636,7 @@
           <a:p>
             <a:fld id="{241EB5C9-1307-BA42-ABA2-0BC069CD8E7F}" type="datetimeFigureOut">
               <a:rPr lang="en-US" smtClean="0"/>
-              <a:t>2/13/23</a:t>
+              <a:t>2/19/23</a:t>
             </a:fld>
             <a:endParaRPr lang="en-US"/>
           </a:p>
@@ -3849,7 +3847,7 @@
           <a:p>
             <a:fld id="{241EB5C9-1307-BA42-ABA2-0BC069CD8E7F}" type="datetimeFigureOut">
               <a:rPr lang="en-US" smtClean="0"/>
-              <a:t>2/13/23</a:t>
+              <a:t>2/19/23</a:t>
             </a:fld>
             <a:endParaRPr lang="en-US"/>
           </a:p>
@@ -4313,7 +4311,8 @@
               <a:buNone/>
             </a:pPr>
             <a:r>
-              <a:t>1/1/23</a:t>
+              <a:rPr lang="en-US" dirty="0"/>
+              <a:t>Spring 2023</a:t>
             </a:r>
           </a:p>
         </p:txBody>
@@ -9597,338 +9596,6 @@
           </a:p>
         </p:txBody>
       </p:sp>
-    </p:spTree>
-  </p:cSld>
-  <p:clrMapOvr>
-    <a:masterClrMapping/>
-  </p:clrMapOvr>
-</p:sld>
-</file>
-
-<file path=ppt/slides/slide38.xml><?xml version="1.0" encoding="utf-8"?>
-<p:sld xmlns:a="http://schemas.openxmlformats.org/drawingml/2006/main" xmlns:r="http://schemas.openxmlformats.org/officeDocument/2006/relationships" xmlns:p="http://schemas.openxmlformats.org/presentationml/2006/main">
-  <p:cSld>
-    <p:spTree>
-      <p:nvGrpSpPr>
-        <p:cNvPr id="1" name=""/>
-        <p:cNvGrpSpPr/>
-        <p:nvPr/>
-      </p:nvGrpSpPr>
-      <p:grpSpPr>
-        <a:xfrm>
-          <a:off x="0" y="0"/>
-          <a:ext cx="0" cy="0"/>
-          <a:chOff x="0" y="0"/>
-          <a:chExt cx="0" cy="0"/>
-        </a:xfrm>
-      </p:grpSpPr>
-      <p:sp>
-        <p:nvSpPr>
-          <p:cNvPr id="2" name="Title 1"/>
-          <p:cNvSpPr>
-            <a:spLocks noGrp="1"/>
-          </p:cNvSpPr>
-          <p:nvPr>
-            <p:ph type="title"/>
-          </p:nvPr>
-        </p:nvSpPr>
-        <p:spPr/>
-        <p:txBody>
-          <a:bodyPr/>
-          <a:lstStyle/>
-          <a:p>
-            <a:pPr marL="0" lvl="0" indent="0">
-              <a:buNone/>
-            </a:pPr>
-            <a:r>
-              <a:t>Policy Subsystems</a:t>
-            </a:r>
-          </a:p>
-        </p:txBody>
-      </p:sp>
-      <p:sp>
-        <p:nvSpPr>
-          <p:cNvPr id="3" name="Content Placeholder 2"/>
-          <p:cNvSpPr>
-            <a:spLocks noGrp="1"/>
-          </p:cNvSpPr>
-          <p:nvPr>
-            <p:ph idx="1"/>
-          </p:nvPr>
-        </p:nvSpPr>
-        <p:spPr/>
-        <p:txBody>
-          <a:bodyPr/>
-          <a:lstStyle/>
-          <a:p>
-            <a:pPr marL="0" lvl="0" indent="0">
-              <a:buNone/>
-            </a:pPr>
-            <a:r>
-              <a:rPr b="1"/>
-              <a:t>Substantive issue alliances that cross institutional boundaries and include both governmental [official] and nongovernmental [unofficial] actors</a:t>
-            </a:r>
-          </a:p>
-          <a:p>
-            <a:pPr lvl="0"/>
-            <a:r>
-              <a:t>Subsystems are organized around a </a:t>
-            </a:r>
-            <a:r>
-              <a:rPr b="1"/>
-              <a:t>policy domain</a:t>
-            </a:r>
-          </a:p>
-          <a:p>
-            <a:pPr lvl="0"/>
-            <a:r>
-              <a:rPr b="1"/>
-              <a:t>Policy domain</a:t>
-            </a:r>
-            <a:r>
-              <a:t>: Substantive area of policy over which participants in policy making compete and compromise (e.g., air pollution, land management)</a:t>
-            </a:r>
-          </a:p>
-        </p:txBody>
-      </p:sp>
-    </p:spTree>
-  </p:cSld>
-  <p:clrMapOvr>
-    <a:masterClrMapping/>
-  </p:clrMapOvr>
-  <p:timing>
-    <p:tnLst>
-      <p:par>
-        <p:cTn id="1" dur="indefinite" restart="never" nodeType="tmRoot">
-          <p:childTnLst>
-            <p:seq concurrent="1" nextAc="seek">
-              <p:cTn id="2" dur="indefinite" nodeType="mainSeq">
-                <p:childTnLst>
-                  <p:par>
-                    <p:cTn id="3" fill="hold">
-                      <p:stCondLst>
-                        <p:cond delay="indefinite"/>
-                      </p:stCondLst>
-                      <p:childTnLst>
-                        <p:par>
-                          <p:cTn id="4" fill="hold">
-                            <p:stCondLst>
-                              <p:cond delay="0"/>
-                            </p:stCondLst>
-                            <p:childTnLst>
-                              <p:par>
-                                <p:cTn id="5" presetID="1" presetClass="entr" presetSubtype="0" fill="hold" grpId="0" nodeType="clickEffect">
-                                  <p:stCondLst>
-                                    <p:cond delay="0"/>
-                                  </p:stCondLst>
-                                  <p:childTnLst>
-                                    <p:set>
-                                      <p:cBhvr>
-                                        <p:cTn id="6" dur="1" fill="hold">
-                                          <p:stCondLst>
-                                            <p:cond delay="0"/>
-                                          </p:stCondLst>
-                                        </p:cTn>
-                                        <p:tgtEl>
-                                          <p:spTgt spid="3">
-                                            <p:txEl>
-                                              <p:pRg st="1" end="1"/>
-                                            </p:txEl>
-                                          </p:spTgt>
-                                        </p:tgtEl>
-                                        <p:attrNameLst>
-                                          <p:attrName>style.visibility</p:attrName>
-                                        </p:attrNameLst>
-                                      </p:cBhvr>
-                                      <p:to>
-                                        <p:strVal val="visible"/>
-                                      </p:to>
-                                    </p:set>
-                                  </p:childTnLst>
-                                </p:cTn>
-                              </p:par>
-                            </p:childTnLst>
-                          </p:cTn>
-                        </p:par>
-                      </p:childTnLst>
-                    </p:cTn>
-                  </p:par>
-                  <p:par>
-                    <p:cTn id="7" fill="hold">
-                      <p:stCondLst>
-                        <p:cond delay="indefinite"/>
-                      </p:stCondLst>
-                      <p:childTnLst>
-                        <p:par>
-                          <p:cTn id="8" fill="hold">
-                            <p:stCondLst>
-                              <p:cond delay="0"/>
-                            </p:stCondLst>
-                            <p:childTnLst>
-                              <p:par>
-                                <p:cTn id="9" presetID="1" presetClass="entr" presetSubtype="0" fill="hold" grpId="0" nodeType="clickEffect">
-                                  <p:stCondLst>
-                                    <p:cond delay="0"/>
-                                  </p:stCondLst>
-                                  <p:childTnLst>
-                                    <p:set>
-                                      <p:cBhvr>
-                                        <p:cTn id="10" dur="1" fill="hold">
-                                          <p:stCondLst>
-                                            <p:cond delay="0"/>
-                                          </p:stCondLst>
-                                        </p:cTn>
-                                        <p:tgtEl>
-                                          <p:spTgt spid="3">
-                                            <p:txEl>
-                                              <p:pRg st="2" end="2"/>
-                                            </p:txEl>
-                                          </p:spTgt>
-                                        </p:tgtEl>
-                                        <p:attrNameLst>
-                                          <p:attrName>style.visibility</p:attrName>
-                                        </p:attrNameLst>
-                                      </p:cBhvr>
-                                      <p:to>
-                                        <p:strVal val="visible"/>
-                                      </p:to>
-                                    </p:set>
-                                  </p:childTnLst>
-                                </p:cTn>
-                              </p:par>
-                            </p:childTnLst>
-                          </p:cTn>
-                        </p:par>
-                      </p:childTnLst>
-                    </p:cTn>
-                  </p:par>
-                </p:childTnLst>
-              </p:cTn>
-              <p:prevCondLst>
-                <p:cond evt="onPrev" delay="0">
-                  <p:tgtEl>
-                    <p:sldTgt/>
-                  </p:tgtEl>
-                </p:cond>
-              </p:prevCondLst>
-              <p:nextCondLst>
-                <p:cond evt="onNext" delay="0">
-                  <p:tgtEl>
-                    <p:sldTgt/>
-                  </p:tgtEl>
-                </p:cond>
-              </p:nextCondLst>
-            </p:seq>
-          </p:childTnLst>
-        </p:cTn>
-      </p:par>
-    </p:tnLst>
-    <p:bldLst>
-      <p:bldP spid="3" grpId="0" uiExpand="1" build="p"/>
-    </p:bldLst>
-  </p:timing>
-</p:sld>
-</file>
-
-<file path=ppt/slides/slide39.xml><?xml version="1.0" encoding="utf-8"?>
-<p:sld xmlns:a="http://schemas.openxmlformats.org/drawingml/2006/main" xmlns:r="http://schemas.openxmlformats.org/officeDocument/2006/relationships" xmlns:p="http://schemas.openxmlformats.org/presentationml/2006/main">
-  <p:cSld>
-    <p:spTree>
-      <p:nvGrpSpPr>
-        <p:cNvPr id="1" name=""/>
-        <p:cNvGrpSpPr/>
-        <p:nvPr/>
-      </p:nvGrpSpPr>
-      <p:grpSpPr>
-        <a:xfrm>
-          <a:off x="0" y="0"/>
-          <a:ext cx="0" cy="0"/>
-          <a:chOff x="0" y="0"/>
-          <a:chExt cx="0" cy="0"/>
-        </a:xfrm>
-      </p:grpSpPr>
-      <p:sp>
-        <p:nvSpPr>
-          <p:cNvPr id="2" name="Title 1"/>
-          <p:cNvSpPr>
-            <a:spLocks noGrp="1"/>
-          </p:cNvSpPr>
-          <p:nvPr>
-            <p:ph type="title"/>
-          </p:nvPr>
-        </p:nvSpPr>
-        <p:spPr/>
-        <p:txBody>
-          <a:bodyPr/>
-          <a:lstStyle/>
-          <a:p>
-            <a:pPr marL="0" lvl="0" indent="0">
-              <a:buNone/>
-            </a:pPr>
-            <a:r>
-              <a:t>Policy Subsystems</a:t>
-            </a:r>
-          </a:p>
-        </p:txBody>
-      </p:sp>
-      <p:sp>
-        <p:nvSpPr>
-          <p:cNvPr id="4" name="Text Placeholder 3"/>
-          <p:cNvSpPr>
-            <a:spLocks noGrp="1"/>
-          </p:cNvSpPr>
-          <p:nvPr>
-            <p:ph idx="1"/>
-          </p:nvPr>
-        </p:nvSpPr>
-        <p:spPr/>
-        <p:txBody>
-          <a:bodyPr/>
-          <a:lstStyle/>
-          <a:p>
-            <a:pPr marL="0" lvl="0" indent="0">
-              <a:spcBef>
-                <a:spcPts val="3000"/>
-              </a:spcBef>
-              <a:buNone/>
-            </a:pPr>
-            <a:r>
-              <a:rPr b="1"/>
-              <a:t>Iron triangles and Issue networks</a:t>
-            </a:r>
-          </a:p>
-        </p:txBody>
-      </p:sp>
-      <p:pic>
-        <p:nvPicPr>
-          <p:cNvPr id="3" name="Picture 1" descr="img/subsystems.jpg"/>
-          <p:cNvPicPr>
-            <a:picLocks noGrp="1" noChangeAspect="1"/>
-          </p:cNvPicPr>
-          <p:nvPr/>
-        </p:nvPicPr>
-        <p:blipFill>
-          <a:blip r:embed="rId2"/>
-          <a:stretch>
-            <a:fillRect/>
-          </a:stretch>
-        </p:blipFill>
-        <p:spPr bwMode="auto">
-          <a:xfrm>
-            <a:off x="1186665" y="1757949"/>
-            <a:ext cx="6770670" cy="3313417"/>
-          </a:xfrm>
-          <a:prstGeom prst="rect">
-            <a:avLst/>
-          </a:prstGeom>
-          <a:noFill/>
-          <a:ln w="9525">
-            <a:noFill/>
-            <a:headEnd/>
-            <a:tailEnd/>
-          </a:ln>
-        </p:spPr>
-      </p:pic>
     </p:spTree>
   </p:cSld>
   <p:clrMapOvr>

</xml_diff>